<commit_message>
working and tested code for 10 itr
</commit_message>
<xml_diff>
--- a/GA .pptx
+++ b/GA .pptx
@@ -152,7 +152,7 @@
               <a:rPr b="0" lang="en-IN" sz="1400" spc="-1" strike="noStrike">
                 <a:latin typeface="Times New Roman"/>
               </a:rPr>
-              <a:t>&lt;header&gt;</a:t>
+              <a:t> </a:t>
             </a:r>
             <a:endParaRPr b="0" lang="en-IN" sz="1400" spc="-1" strike="noStrike">
               <a:latin typeface="Times New Roman"/>
@@ -187,7 +187,7 @@
               <a:rPr b="0" lang="en-IN" sz="1400" spc="-1" strike="noStrike">
                 <a:latin typeface="Times New Roman"/>
               </a:rPr>
-              <a:t>&lt;date/time&gt;</a:t>
+              <a:t> </a:t>
             </a:r>
             <a:endParaRPr b="0" lang="en-IN" sz="1400" spc="-1" strike="noStrike">
               <a:latin typeface="Times New Roman"/>
@@ -221,7 +221,7 @@
               <a:rPr b="0" lang="en-IN" sz="1400" spc="-1" strike="noStrike">
                 <a:latin typeface="Times New Roman"/>
               </a:rPr>
-              <a:t>&lt;footer&gt;</a:t>
+              <a:t> </a:t>
             </a:r>
             <a:endParaRPr b="0" lang="en-IN" sz="1400" spc="-1" strike="noStrike">
               <a:latin typeface="Times New Roman"/>
@@ -252,11 +252,11 @@
           <a:bodyPr lIns="0" rIns="0" tIns="0" bIns="0" anchor="b"/>
           <a:p>
             <a:pPr algn="r"/>
-            <a:fld id="{D1E0000B-340E-40D4-9D4B-6AEC044CB05F}" type="slidenum">
+            <a:fld id="{84FD2DAF-B59D-40C4-B631-041FCF115C1D}" type="slidenum">
               <a:rPr b="0" lang="en-IN" sz="1400" spc="-1" strike="noStrike">
                 <a:latin typeface="Times New Roman"/>
               </a:rPr>
-              <a:t>&lt;number&gt;</a:t>
+              <a:t>1</a:t>
             </a:fld>
             <a:endParaRPr b="0" lang="en-IN" sz="1400" spc="-1" strike="noStrike">
               <a:latin typeface="Times New Roman"/>
@@ -368,7 +368,7 @@
                 <a:spcPct val="100000"/>
               </a:lnSpc>
             </a:pPr>
-            <a:fld id="{D3309632-DF66-4D4A-95C9-B6119EB3E45C}" type="slidenum">
+            <a:fld id="{BC8D307A-EB88-47E5-8694-DCBBE8F733D3}" type="slidenum">
               <a:rPr b="0" lang="en-IN" sz="1200" spc="-1" strike="noStrike">
                 <a:solidFill>
                   <a:srgbClr val="000000"/>
@@ -7599,7 +7599,7 @@
                 <a:spcPct val="100000"/>
               </a:lnSpc>
             </a:pPr>
-            <a:fld id="{D9678EF7-5576-4E64-9636-AF6269CDAF25}" type="slidenum">
+            <a:fld id="{C0905788-7E4F-41FE-BF2D-0480BBC486D7}" type="slidenum">
               <a:rPr b="0" lang="en-IN" sz="1050" spc="-1" strike="noStrike">
                 <a:solidFill>
                   <a:srgbClr val="ffffff"/>
@@ -7882,7 +7882,7 @@
                 <a:spcPct val="100000"/>
               </a:lnSpc>
             </a:pPr>
-            <a:fld id="{A5947977-985B-4898-B49B-759A3DF0C0A0}" type="slidenum">
+            <a:fld id="{BA0C81D2-D7BB-4096-8FED-D70FAA6F60CD}" type="slidenum">
               <a:rPr b="0" lang="en-IN" sz="1050" spc="-1" strike="noStrike">
                 <a:solidFill>
                   <a:srgbClr val="ffffff"/>
@@ -8114,7 +8114,7 @@
                 <a:spcPct val="100000"/>
               </a:lnSpc>
             </a:pPr>
-            <a:fld id="{EA7EAAD6-9AFB-44E3-9E1B-8830CCC1EEC5}" type="slidenum">
+            <a:fld id="{2D9117F3-C762-49ED-882B-637EBCD4C913}" type="slidenum">
               <a:rPr b="0" lang="en-IN" sz="1050" spc="-1" strike="noStrike">
                 <a:solidFill>
                   <a:srgbClr val="ffffff"/>
@@ -8373,7 +8373,7 @@
                 <a:spcPct val="100000"/>
               </a:lnSpc>
             </a:pPr>
-            <a:fld id="{B7EBA6FE-A848-4983-8988-2CE0FE62F133}" type="slidenum">
+            <a:fld id="{BFA82A82-B711-4359-B4B2-8EF9D3D08F0E}" type="slidenum">
               <a:rPr b="0" lang="en-IN" sz="1050" spc="-1" strike="noStrike">
                 <a:solidFill>
                   <a:srgbClr val="ffffff"/>
@@ -8589,6 +8589,28 @@
           <a:effectRef idx="0"/>
           <a:fontRef idx="minor"/>
         </p:style>
+        <p:txBody>
+          <a:bodyPr lIns="90000" rIns="90000" tIns="45000" bIns="45000" anchor="ctr"/>
+          <a:p>
+            <a:pPr algn="r">
+              <a:lnSpc>
+                <a:spcPct val="100000"/>
+              </a:lnSpc>
+            </a:pPr>
+            <a:fld id="{C0206433-E39D-4172-99A6-2566BE4194EB}" type="slidenum">
+              <a:rPr b="0" lang="en-IN" sz="1050" spc="-1" strike="noStrike">
+                <a:solidFill>
+                  <a:srgbClr val="637052"/>
+                </a:solidFill>
+                <a:latin typeface="Calibri"/>
+              </a:rPr>
+              <a:t>&lt;number&gt;</a:t>
+            </a:fld>
+            <a:endParaRPr b="0" lang="en-IN" sz="1050" spc="-1" strike="noStrike">
+              <a:latin typeface="Arial"/>
+            </a:endParaRPr>
+          </a:p>
+        </p:txBody>
       </p:sp>
       <p:pic>
         <p:nvPicPr>
@@ -8814,6 +8836,28 @@
           <a:effectRef idx="0"/>
           <a:fontRef idx="minor"/>
         </p:style>
+        <p:txBody>
+          <a:bodyPr lIns="90000" rIns="90000" tIns="45000" bIns="45000" anchor="ctr"/>
+          <a:p>
+            <a:pPr algn="r">
+              <a:lnSpc>
+                <a:spcPct val="100000"/>
+              </a:lnSpc>
+            </a:pPr>
+            <a:fld id="{52A4885A-ACA7-4050-9687-3B661BD3652C}" type="slidenum">
+              <a:rPr b="0" lang="en-IN" sz="1050" spc="-1" strike="noStrike">
+                <a:solidFill>
+                  <a:srgbClr val="637052"/>
+                </a:solidFill>
+                <a:latin typeface="Calibri"/>
+              </a:rPr>
+              <a:t>&lt;number&gt;</a:t>
+            </a:fld>
+            <a:endParaRPr b="0" lang="en-IN" sz="1050" spc="-1" strike="noStrike">
+              <a:latin typeface="Arial"/>
+            </a:endParaRPr>
+          </a:p>
+        </p:txBody>
       </p:sp>
       <p:pic>
         <p:nvPicPr>
@@ -9100,6 +9144,28 @@
           <a:effectRef idx="0"/>
           <a:fontRef idx="minor"/>
         </p:style>
+        <p:txBody>
+          <a:bodyPr lIns="90000" rIns="90000" tIns="45000" bIns="45000" anchor="ctr"/>
+          <a:p>
+            <a:pPr algn="r">
+              <a:lnSpc>
+                <a:spcPct val="100000"/>
+              </a:lnSpc>
+            </a:pPr>
+            <a:fld id="{4D79397B-1759-4893-8F34-A1539B7867D2}" type="slidenum">
+              <a:rPr b="0" lang="en-IN" sz="1050" spc="-1" strike="noStrike">
+                <a:solidFill>
+                  <a:srgbClr val="637052"/>
+                </a:solidFill>
+                <a:latin typeface="Calibri"/>
+              </a:rPr>
+              <a:t>&lt;number&gt;</a:t>
+            </a:fld>
+            <a:endParaRPr b="0" lang="en-IN" sz="1050" spc="-1" strike="noStrike">
+              <a:latin typeface="Arial"/>
+            </a:endParaRPr>
+          </a:p>
+        </p:txBody>
       </p:sp>
       <p:pic>
         <p:nvPicPr>
@@ -9322,6 +9388,28 @@
           <a:effectRef idx="0"/>
           <a:fontRef idx="minor"/>
         </p:style>
+        <p:txBody>
+          <a:bodyPr lIns="90000" rIns="90000" tIns="45000" bIns="45000" anchor="ctr"/>
+          <a:p>
+            <a:pPr algn="r">
+              <a:lnSpc>
+                <a:spcPct val="100000"/>
+              </a:lnSpc>
+            </a:pPr>
+            <a:fld id="{6C45CD6B-54F9-4471-9337-C0215D86C2F7}" type="slidenum">
+              <a:rPr b="0" lang="en-IN" sz="1050" spc="-1" strike="noStrike">
+                <a:solidFill>
+                  <a:srgbClr val="ffffff"/>
+                </a:solidFill>
+                <a:latin typeface="Calibri"/>
+              </a:rPr>
+              <a:t>&lt;number&gt;</a:t>
+            </a:fld>
+            <a:endParaRPr b="0" lang="en-IN" sz="1050" spc="-1" strike="noStrike">
+              <a:latin typeface="Arial"/>
+            </a:endParaRPr>
+          </a:p>
+        </p:txBody>
       </p:sp>
       <p:pic>
         <p:nvPicPr>
@@ -9613,6 +9701,28 @@
           <a:effectRef idx="0"/>
           <a:fontRef idx="minor"/>
         </p:style>
+        <p:txBody>
+          <a:bodyPr lIns="90000" rIns="90000" tIns="45000" bIns="45000" anchor="ctr"/>
+          <a:p>
+            <a:pPr algn="r">
+              <a:lnSpc>
+                <a:spcPct val="100000"/>
+              </a:lnSpc>
+            </a:pPr>
+            <a:fld id="{3E3D3DC7-E415-48D0-94D8-A60DC4907854}" type="slidenum">
+              <a:rPr b="0" lang="en-IN" sz="1050" spc="-1" strike="noStrike">
+                <a:solidFill>
+                  <a:srgbClr val="ffffff"/>
+                </a:solidFill>
+                <a:latin typeface="Calibri"/>
+              </a:rPr>
+              <a:t>&lt;number&gt;</a:t>
+            </a:fld>
+            <a:endParaRPr b="0" lang="en-IN" sz="1050" spc="-1" strike="noStrike">
+              <a:latin typeface="Arial"/>
+            </a:endParaRPr>
+          </a:p>
+        </p:txBody>
       </p:sp>
       <p:pic>
         <p:nvPicPr>
@@ -10043,6 +10153,28 @@
           <a:effectRef idx="0"/>
           <a:fontRef idx="minor"/>
         </p:style>
+        <p:txBody>
+          <a:bodyPr lIns="90000" rIns="90000" tIns="45000" bIns="45000" anchor="ctr"/>
+          <a:p>
+            <a:pPr algn="r">
+              <a:lnSpc>
+                <a:spcPct val="100000"/>
+              </a:lnSpc>
+            </a:pPr>
+            <a:fld id="{A79976DC-D4AC-44ED-AE67-EFC272E77F35}" type="slidenum">
+              <a:rPr b="0" lang="en-IN" sz="1050" spc="-1" strike="noStrike">
+                <a:solidFill>
+                  <a:srgbClr val="ffffff"/>
+                </a:solidFill>
+                <a:latin typeface="Calibri"/>
+              </a:rPr>
+              <a:t>&lt;number&gt;</a:t>
+            </a:fld>
+            <a:endParaRPr b="0" lang="en-IN" sz="1050" spc="-1" strike="noStrike">
+              <a:latin typeface="Arial"/>
+            </a:endParaRPr>
+          </a:p>
+        </p:txBody>
       </p:sp>
     </p:spTree>
   </p:cSld>
@@ -10281,6 +10413,28 @@
           <a:effectRef idx="0"/>
           <a:fontRef idx="minor"/>
         </p:style>
+        <p:txBody>
+          <a:bodyPr lIns="90000" rIns="90000" tIns="45000" bIns="45000" anchor="ctr"/>
+          <a:p>
+            <a:pPr algn="r">
+              <a:lnSpc>
+                <a:spcPct val="100000"/>
+              </a:lnSpc>
+            </a:pPr>
+            <a:fld id="{68DC133E-2272-4D29-A78C-F07B137EA08E}" type="slidenum">
+              <a:rPr b="0" lang="en-IN" sz="1050" spc="-1" strike="noStrike">
+                <a:solidFill>
+                  <a:srgbClr val="637052"/>
+                </a:solidFill>
+                <a:latin typeface="Calibri"/>
+              </a:rPr>
+              <a:t>&lt;number&gt;</a:t>
+            </a:fld>
+            <a:endParaRPr b="0" lang="en-IN" sz="1050" spc="-1" strike="noStrike">
+              <a:latin typeface="Arial"/>
+            </a:endParaRPr>
+          </a:p>
+        </p:txBody>
       </p:sp>
       <p:pic>
         <p:nvPicPr>
@@ -10745,7 +10899,7 @@
                 <a:spcPct val="100000"/>
               </a:lnSpc>
             </a:pPr>
-            <a:fld id="{758BC2AF-8E84-428B-AA46-A52934B299CD}" type="slidenum">
+            <a:fld id="{964C8DED-0C2C-402C-B800-3404BCC4797A}" type="slidenum">
               <a:rPr b="0" lang="en-IN" sz="1050" spc="-1" strike="noStrike">
                 <a:solidFill>
                   <a:srgbClr val="ffffff"/>
@@ -10969,6 +11123,28 @@
           <a:effectRef idx="0"/>
           <a:fontRef idx="minor"/>
         </p:style>
+        <p:txBody>
+          <a:bodyPr lIns="90000" rIns="90000" tIns="45000" bIns="45000" anchor="ctr"/>
+          <a:p>
+            <a:pPr algn="r">
+              <a:lnSpc>
+                <a:spcPct val="100000"/>
+              </a:lnSpc>
+            </a:pPr>
+            <a:fld id="{ABDD39A3-56FE-4049-BDFC-B8F2FDAC7848}" type="slidenum">
+              <a:rPr b="0" lang="en-IN" sz="1050" spc="-1" strike="noStrike">
+                <a:solidFill>
+                  <a:srgbClr val="ffffff"/>
+                </a:solidFill>
+                <a:latin typeface="Calibri"/>
+              </a:rPr>
+              <a:t>&lt;number&gt;</a:t>
+            </a:fld>
+            <a:endParaRPr b="0" lang="en-IN" sz="1050" spc="-1" strike="noStrike">
+              <a:latin typeface="Arial"/>
+            </a:endParaRPr>
+          </a:p>
+        </p:txBody>
       </p:sp>
     </p:spTree>
   </p:cSld>
@@ -11247,6 +11423,28 @@
           <a:effectRef idx="0"/>
           <a:fontRef idx="minor"/>
         </p:style>
+        <p:txBody>
+          <a:bodyPr lIns="90000" rIns="90000" tIns="45000" bIns="45000" anchor="ctr"/>
+          <a:p>
+            <a:pPr algn="r">
+              <a:lnSpc>
+                <a:spcPct val="100000"/>
+              </a:lnSpc>
+            </a:pPr>
+            <a:fld id="{311098BA-284A-46D8-A3E7-E5FF09757F88}" type="slidenum">
+              <a:rPr b="0" lang="en-IN" sz="1050" spc="-1" strike="noStrike">
+                <a:solidFill>
+                  <a:srgbClr val="ffffff"/>
+                </a:solidFill>
+                <a:latin typeface="Calibri"/>
+              </a:rPr>
+              <a:t>&lt;number&gt;</a:t>
+            </a:fld>
+            <a:endParaRPr b="0" lang="en-IN" sz="1050" spc="-1" strike="noStrike">
+              <a:latin typeface="Arial"/>
+            </a:endParaRPr>
+          </a:p>
+        </p:txBody>
       </p:sp>
       <p:pic>
         <p:nvPicPr>
@@ -11480,6 +11678,28 @@
           <a:effectRef idx="0"/>
           <a:fontRef idx="minor"/>
         </p:style>
+        <p:txBody>
+          <a:bodyPr lIns="90000" rIns="90000" tIns="45000" bIns="45000" anchor="ctr"/>
+          <a:p>
+            <a:pPr algn="r">
+              <a:lnSpc>
+                <a:spcPct val="100000"/>
+              </a:lnSpc>
+            </a:pPr>
+            <a:fld id="{E5C00E2A-A527-448A-9464-D0F850B82E7C}" type="slidenum">
+              <a:rPr b="0" lang="en-IN" sz="1050" spc="-1" strike="noStrike">
+                <a:solidFill>
+                  <a:srgbClr val="ffffff"/>
+                </a:solidFill>
+                <a:latin typeface="Calibri"/>
+              </a:rPr>
+              <a:t>&lt;number&gt;</a:t>
+            </a:fld>
+            <a:endParaRPr b="0" lang="en-IN" sz="1050" spc="-1" strike="noStrike">
+              <a:latin typeface="Arial"/>
+            </a:endParaRPr>
+          </a:p>
+        </p:txBody>
       </p:sp>
     </p:spTree>
   </p:cSld>
@@ -11724,6 +11944,28 @@
           <a:effectRef idx="0"/>
           <a:fontRef idx="minor"/>
         </p:style>
+        <p:txBody>
+          <a:bodyPr lIns="90000" rIns="90000" tIns="45000" bIns="45000" anchor="ctr"/>
+          <a:p>
+            <a:pPr algn="r">
+              <a:lnSpc>
+                <a:spcPct val="100000"/>
+              </a:lnSpc>
+            </a:pPr>
+            <a:fld id="{2D05C201-9DE1-4210-9386-06E730C8D64D}" type="slidenum">
+              <a:rPr b="0" lang="en-IN" sz="1050" spc="-1" strike="noStrike">
+                <a:solidFill>
+                  <a:srgbClr val="ffffff"/>
+                </a:solidFill>
+                <a:latin typeface="Calibri"/>
+              </a:rPr>
+              <a:t>&lt;number&gt;</a:t>
+            </a:fld>
+            <a:endParaRPr b="0" lang="en-IN" sz="1050" spc="-1" strike="noStrike">
+              <a:latin typeface="Arial"/>
+            </a:endParaRPr>
+          </a:p>
+        </p:txBody>
       </p:sp>
     </p:spTree>
   </p:cSld>
@@ -11878,7 +12120,7 @@
                 <a:spcPct val="100000"/>
               </a:lnSpc>
             </a:pPr>
-            <a:fld id="{51201CFF-07D4-49B3-BC1E-EB2FA8C4B655}" type="slidenum">
+            <a:fld id="{5425B7B0-F2EE-4713-A7D6-A671496BF073}" type="slidenum">
               <a:rPr b="0" lang="en-IN" sz="1050" spc="-1" strike="noStrike">
                 <a:solidFill>
                   <a:srgbClr val="ffffff"/>
@@ -12255,7 +12497,7 @@
                 <a:spcPct val="100000"/>
               </a:lnSpc>
             </a:pPr>
-            <a:fld id="{3ED0C542-4F9A-437F-8EB5-C521221318B5}" type="slidenum">
+            <a:fld id="{8200C440-6574-4864-9305-88765652B378}" type="slidenum">
               <a:rPr b="0" lang="en-IN" sz="1050" spc="-1" strike="noStrike">
                 <a:solidFill>
                   <a:srgbClr val="ffffff"/>
@@ -12599,7 +12841,7 @@
                 <a:spcPct val="100000"/>
               </a:lnSpc>
             </a:pPr>
-            <a:fld id="{216A508B-8465-421F-9196-5B7DAFD75F01}" type="slidenum">
+            <a:fld id="{56F4435F-7464-46A4-9707-5B0DF1D24EDE}" type="slidenum">
               <a:rPr b="0" lang="en-IN" sz="1050" spc="-1" strike="noStrike">
                 <a:solidFill>
                   <a:srgbClr val="ffffff"/>
@@ -12947,7 +13189,7 @@
                 <a:spcPct val="100000"/>
               </a:lnSpc>
             </a:pPr>
-            <a:fld id="{F0B63F66-9CE0-4ED8-89EE-60B1198FD175}" type="slidenum">
+            <a:fld id="{F1B2DAA3-7A58-439B-95DD-D5A51D20CC9A}" type="slidenum">
               <a:rPr b="0" lang="en-IN" sz="1050" spc="-1" strike="noStrike">
                 <a:solidFill>
                   <a:srgbClr val="ffffff"/>
@@ -13278,7 +13520,7 @@
                 <a:spcPct val="100000"/>
               </a:lnSpc>
             </a:pPr>
-            <a:fld id="{F0F7C554-225E-46A5-ADBF-0FBE9A56EAF5}" type="slidenum">
+            <a:fld id="{6480FA02-97F1-4924-A856-7C7925E5B6C2}" type="slidenum">
               <a:rPr b="0" lang="en-IN" sz="1050" spc="-1" strike="noStrike">
                 <a:solidFill>
                   <a:srgbClr val="ffffff"/>
@@ -13602,7 +13844,7 @@
                 <a:spcPct val="100000"/>
               </a:lnSpc>
             </a:pPr>
-            <a:fld id="{A109BE73-677C-4BD7-BDF3-14B2FED1F5A6}" type="slidenum">
+            <a:fld id="{E7DBA1AD-41B3-409F-BE39-C99B35EBA2B8}" type="slidenum">
               <a:rPr b="0" lang="en-IN" sz="1050" spc="-1" strike="noStrike">
                 <a:solidFill>
                   <a:srgbClr val="ffffff"/>
@@ -13928,7 +14170,7 @@
                 <a:spcPct val="100000"/>
               </a:lnSpc>
             </a:pPr>
-            <a:fld id="{77908331-F6CC-40AD-A7AD-A82664221716}" type="slidenum">
+            <a:fld id="{A857B52A-6FC3-4E7C-B55C-55E402623202}" type="slidenum">
               <a:rPr b="0" lang="en-IN" sz="1050" spc="-1" strike="noStrike">
                 <a:solidFill>
                   <a:srgbClr val="ffffff"/>

</xml_diff>